<commit_message>
added CodeAcademy assignment replacement
</commit_message>
<xml_diff>
--- a/lecture02.ingestion/lecture02.pptx
+++ b/lecture02.ingestion/lecture02.pptx
@@ -5,7 +5,7 @@
     <p:sldMasterId id="2147483648" r:id="rId1"/>
   </p:sldMasterIdLst>
   <p:notesMasterIdLst>
-    <p:notesMasterId r:id="rId30"/>
+    <p:notesMasterId r:id="rId33"/>
   </p:notesMasterIdLst>
   <p:sldIdLst>
     <p:sldId id="256" r:id="rId2"/>
@@ -34,8 +34,11 @@
     <p:sldId id="328" r:id="rId25"/>
     <p:sldId id="324" r:id="rId26"/>
     <p:sldId id="323" r:id="rId27"/>
-    <p:sldId id="309" r:id="rId28"/>
-    <p:sldId id="311" r:id="rId29"/>
+    <p:sldId id="330" r:id="rId28"/>
+    <p:sldId id="329" r:id="rId29"/>
+    <p:sldId id="331" r:id="rId30"/>
+    <p:sldId id="309" r:id="rId31"/>
+    <p:sldId id="311" r:id="rId32"/>
   </p:sldIdLst>
   <p:sldSz cx="12192000" cy="6858000"/>
   <p:notesSz cx="6858000" cy="9144000"/>
@@ -5934,21 +5937,11 @@
           <a:p>
             <a:r>
               <a:rPr lang="en-US" dirty="0" smtClean="0"/>
-              <a:t>Data Ingestion</a:t>
-            </a:r>
-            <a:br>
+              <a:t>Data </a:t>
+            </a:r>
+            <a:r>
               <a:rPr lang="en-US" dirty="0" smtClean="0"/>
-            </a:br>
-            <a:r>
-              <a:rPr lang="en-US" dirty="0" smtClean="0"/>
-              <a:t>&amp;</a:t>
-            </a:r>
-            <a:br>
-              <a:rPr lang="en-US" dirty="0" smtClean="0"/>
-            </a:br>
-            <a:r>
-              <a:rPr lang="en-US" dirty="0" smtClean="0"/>
-              <a:t>Web Scraping</a:t>
+              <a:t>Ingestion</a:t>
             </a:r>
             <a:endParaRPr lang="en-US" dirty="0"/>
           </a:p>
@@ -10070,18 +10063,21 @@
             <p:ph idx="1"/>
           </p:nvPr>
         </p:nvSpPr>
-        <p:spPr/>
+        <p:spPr>
+          <a:xfrm>
+            <a:off x="838200" y="1825624"/>
+            <a:ext cx="10515600" cy="5032375"/>
+          </a:xfrm>
+        </p:spPr>
         <p:txBody>
-          <a:bodyPr/>
+          <a:bodyPr>
+            <a:normAutofit/>
+          </a:bodyPr>
           <a:lstStyle/>
           <a:p>
             <a:r>
               <a:rPr lang="en-US" dirty="0" smtClean="0"/>
-              <a:t>Python </a:t>
-            </a:r>
-            <a:r>
-              <a:rPr lang="en-US" dirty="0" smtClean="0"/>
-              <a:t>Review</a:t>
+              <a:t>Python Review</a:t>
             </a:r>
           </a:p>
           <a:p>
@@ -10097,7 +10093,6 @@
               <a:rPr lang="en-US" dirty="0" smtClean="0"/>
               <a:t> &amp; Requirements</a:t>
             </a:r>
-            <a:endParaRPr lang="en-US" dirty="0" smtClean="0"/>
           </a:p>
           <a:p>
             <a:r>
@@ -10143,8 +10138,23 @@
           <a:p>
             <a:r>
               <a:rPr lang="en-US" dirty="0" smtClean="0"/>
-              <a:t>Web Scraping</a:t>
-            </a:r>
+              <a:t>Assignment: for the </a:t>
+            </a:r>
+            <a:r>
+              <a:rPr lang="en-US" dirty="0" err="1" smtClean="0"/>
+              <a:t>CodeAcademy</a:t>
+            </a:r>
+            <a:r>
+              <a:rPr lang="en-US" dirty="0" smtClean="0"/>
+              <a:t> submission</a:t>
+            </a:r>
+          </a:p>
+          <a:p>
+            <a:r>
+              <a:rPr lang="en-US" dirty="0" smtClean="0"/>
+              <a:t>Web Scraping (if we have time)</a:t>
+            </a:r>
+            <a:endParaRPr lang="en-US" dirty="0" smtClean="0"/>
           </a:p>
         </p:txBody>
       </p:sp>
@@ -13174,11 +13184,6 @@
               </a:rPr>
               <a:t> </a:t>
             </a:r>
-            <a:endParaRPr lang="en-US" dirty="0">
-              <a:latin typeface="Courier New" charset="0"/>
-              <a:ea typeface="Courier New" charset="0"/>
-              <a:cs typeface="Courier New" charset="0"/>
-            </a:endParaRPr>
           </a:p>
           <a:p>
             <a:endParaRPr lang="en-US" dirty="0">
@@ -13525,6 +13530,551 @@
           <a:chExt cx="0" cy="0"/>
         </a:xfrm>
       </p:grpSpPr>
+      <p:pic>
+        <p:nvPicPr>
+          <p:cNvPr id="4" name="Picture 3"/>
+          <p:cNvPicPr>
+            <a:picLocks noChangeAspect="1"/>
+          </p:cNvPicPr>
+          <p:nvPr/>
+        </p:nvPicPr>
+        <p:blipFill>
+          <a:blip r:embed="rId2">
+            <a:extLst>
+              <a:ext uri="{28A0092B-C50C-407E-A947-70E740481C1C}">
+                <a14:useLocalDpi xmlns:a14="http://schemas.microsoft.com/office/drawing/2010/main" val="0"/>
+              </a:ext>
+            </a:extLst>
+          </a:blip>
+          <a:stretch>
+            <a:fillRect/>
+          </a:stretch>
+        </p:blipFill>
+        <p:spPr>
+          <a:xfrm>
+            <a:off x="1538941" y="365125"/>
+            <a:ext cx="9645805" cy="6858000"/>
+          </a:xfrm>
+          <a:prstGeom prst="rect">
+            <a:avLst/>
+          </a:prstGeom>
+        </p:spPr>
+      </p:pic>
+    </p:spTree>
+    <p:extLst>
+      <p:ext uri="{BB962C8B-B14F-4D97-AF65-F5344CB8AC3E}">
+        <p14:creationId xmlns:p14="http://schemas.microsoft.com/office/powerpoint/2010/main" val="922010496"/>
+      </p:ext>
+    </p:extLst>
+  </p:cSld>
+  <p:clrMapOvr>
+    <a:masterClrMapping/>
+  </p:clrMapOvr>
+</p:sld>
+</file>
+
+<file path=ppt/slides/slide28.xml><?xml version="1.0" encoding="utf-8"?>
+<p:sld xmlns:a="http://schemas.openxmlformats.org/drawingml/2006/main" xmlns:r="http://schemas.openxmlformats.org/officeDocument/2006/relationships" xmlns:p="http://schemas.openxmlformats.org/presentationml/2006/main">
+  <p:cSld>
+    <p:spTree>
+      <p:nvGrpSpPr>
+        <p:cNvPr id="1" name=""/>
+        <p:cNvGrpSpPr/>
+        <p:nvPr/>
+      </p:nvGrpSpPr>
+      <p:grpSpPr>
+        <a:xfrm>
+          <a:off x="0" y="0"/>
+          <a:ext cx="0" cy="0"/>
+          <a:chOff x="0" y="0"/>
+          <a:chExt cx="0" cy="0"/>
+        </a:xfrm>
+      </p:grpSpPr>
+      <p:sp>
+        <p:nvSpPr>
+          <p:cNvPr id="2" name="Title 1"/>
+          <p:cNvSpPr>
+            <a:spLocks noGrp="1"/>
+          </p:cNvSpPr>
+          <p:nvPr>
+            <p:ph type="title"/>
+          </p:nvPr>
+        </p:nvSpPr>
+        <p:spPr>
+          <a:xfrm>
+            <a:off x="838200" y="365125"/>
+            <a:ext cx="11353800" cy="1325563"/>
+          </a:xfrm>
+        </p:spPr>
+        <p:txBody>
+          <a:bodyPr>
+            <a:normAutofit/>
+          </a:bodyPr>
+          <a:lstStyle/>
+          <a:p>
+            <a:r>
+              <a:rPr lang="en-US" sz="3800" b="1" dirty="0" smtClean="0">
+                <a:latin typeface="Arial Hebrew" charset="-79"/>
+                <a:ea typeface="Arial Hebrew" charset="-79"/>
+                <a:cs typeface="Arial Hebrew" charset="-79"/>
+              </a:rPr>
+              <a:t>Submission for Completing </a:t>
+            </a:r>
+            <a:r>
+              <a:rPr lang="en-US" sz="3800" b="1" dirty="0" err="1" smtClean="0">
+                <a:latin typeface="Arial Hebrew" charset="-79"/>
+                <a:ea typeface="Arial Hebrew" charset="-79"/>
+                <a:cs typeface="Arial Hebrew" charset="-79"/>
+              </a:rPr>
+              <a:t>CodeAcademy</a:t>
+            </a:r>
+            <a:r>
+              <a:rPr lang="en-US" sz="3800" b="1" dirty="0" smtClean="0">
+                <a:latin typeface="Arial Hebrew" charset="-79"/>
+                <a:ea typeface="Arial Hebrew" charset="-79"/>
+                <a:cs typeface="Arial Hebrew" charset="-79"/>
+              </a:rPr>
+              <a:t> Assignment</a:t>
+            </a:r>
+            <a:endParaRPr lang="en-US" sz="3800" b="1" dirty="0">
+              <a:latin typeface="Arial Hebrew" charset="-79"/>
+              <a:ea typeface="Arial Hebrew" charset="-79"/>
+              <a:cs typeface="Arial Hebrew" charset="-79"/>
+            </a:endParaRPr>
+          </a:p>
+        </p:txBody>
+      </p:sp>
+      <p:sp>
+        <p:nvSpPr>
+          <p:cNvPr id="3" name="Content Placeholder 2"/>
+          <p:cNvSpPr>
+            <a:spLocks noGrp="1"/>
+          </p:cNvSpPr>
+          <p:nvPr>
+            <p:ph idx="1"/>
+          </p:nvPr>
+        </p:nvSpPr>
+        <p:spPr>
+          <a:xfrm>
+            <a:off x="838200" y="1825625"/>
+            <a:ext cx="10295965" cy="4351338"/>
+          </a:xfrm>
+        </p:spPr>
+        <p:txBody>
+          <a:bodyPr>
+            <a:normAutofit/>
+          </a:bodyPr>
+          <a:lstStyle/>
+          <a:p>
+            <a:pPr marL="0" indent="0">
+              <a:buNone/>
+            </a:pPr>
+            <a:r>
+              <a:rPr lang="en-US" dirty="0"/>
+              <a:t>This assignment will represent your completion of any Python online </a:t>
+            </a:r>
+            <a:r>
+              <a:rPr lang="en-US" dirty="0" smtClean="0"/>
+              <a:t>tutorial: </a:t>
+            </a:r>
+          </a:p>
+          <a:p>
+            <a:pPr marL="0" indent="0">
+              <a:buNone/>
+            </a:pPr>
+            <a:endParaRPr lang="en-US" dirty="0" smtClean="0"/>
+          </a:p>
+          <a:p>
+            <a:pPr marL="457200" lvl="1" indent="0">
+              <a:buNone/>
+            </a:pPr>
+            <a:r>
+              <a:rPr lang="en-US" sz="2800" dirty="0" smtClean="0">
+                <a:latin typeface="Courier New" charset="0"/>
+                <a:ea typeface="Courier New" charset="0"/>
+                <a:cs typeface="Courier New" charset="0"/>
+              </a:rPr>
+              <a:t>https</a:t>
+            </a:r>
+            <a:r>
+              <a:rPr lang="en-US" sz="2800" dirty="0">
+                <a:latin typeface="Courier New" charset="0"/>
+                <a:ea typeface="Courier New" charset="0"/>
+                <a:cs typeface="Courier New" charset="0"/>
+              </a:rPr>
+              <a:t>://</a:t>
+            </a:r>
+            <a:r>
+              <a:rPr lang="en-US" sz="2800" dirty="0" err="1">
+                <a:latin typeface="Courier New" charset="0"/>
+                <a:ea typeface="Courier New" charset="0"/>
+                <a:cs typeface="Courier New" charset="0"/>
+              </a:rPr>
+              <a:t>www.learnpython.org</a:t>
+            </a:r>
+            <a:r>
+              <a:rPr lang="en-US" sz="2800" dirty="0">
+                <a:latin typeface="Courier New" charset="0"/>
+                <a:ea typeface="Courier New" charset="0"/>
+                <a:cs typeface="Courier New" charset="0"/>
+              </a:rPr>
+              <a:t>/</a:t>
+            </a:r>
+          </a:p>
+          <a:p>
+            <a:pPr marL="457200" lvl="1" indent="0">
+              <a:buNone/>
+            </a:pPr>
+            <a:r>
+              <a:rPr lang="en-US" sz="2800" dirty="0">
+                <a:latin typeface="Courier New" charset="0"/>
+                <a:ea typeface="Courier New" charset="0"/>
+                <a:cs typeface="Courier New" charset="0"/>
+              </a:rPr>
+              <a:t>https://</a:t>
+            </a:r>
+            <a:r>
+              <a:rPr lang="en-US" sz="2800" dirty="0" err="1">
+                <a:latin typeface="Courier New" charset="0"/>
+                <a:ea typeface="Courier New" charset="0"/>
+                <a:cs typeface="Courier New" charset="0"/>
+              </a:rPr>
+              <a:t>www.codecademy.com</a:t>
+            </a:r>
+            <a:r>
+              <a:rPr lang="en-US" sz="2800" dirty="0">
+                <a:latin typeface="Courier New" charset="0"/>
+                <a:ea typeface="Courier New" charset="0"/>
+                <a:cs typeface="Courier New" charset="0"/>
+              </a:rPr>
+              <a:t>/learn/python</a:t>
+            </a:r>
+          </a:p>
+          <a:p>
+            <a:pPr marL="457200" lvl="1" indent="0">
+              <a:buNone/>
+            </a:pPr>
+            <a:r>
+              <a:rPr lang="en-US" sz="2800" dirty="0">
+                <a:latin typeface="Courier New" charset="0"/>
+                <a:ea typeface="Courier New" charset="0"/>
+                <a:cs typeface="Courier New" charset="0"/>
+              </a:rPr>
+              <a:t>https://</a:t>
+            </a:r>
+            <a:r>
+              <a:rPr lang="en-US" sz="2800" dirty="0" err="1">
+                <a:latin typeface="Courier New" charset="0"/>
+                <a:ea typeface="Courier New" charset="0"/>
+                <a:cs typeface="Courier New" charset="0"/>
+              </a:rPr>
+              <a:t>developers.google.com</a:t>
+            </a:r>
+            <a:r>
+              <a:rPr lang="en-US" sz="2800" dirty="0">
+                <a:latin typeface="Courier New" charset="0"/>
+                <a:ea typeface="Courier New" charset="0"/>
+                <a:cs typeface="Courier New" charset="0"/>
+              </a:rPr>
+              <a:t>/</a:t>
+            </a:r>
+            <a:r>
+              <a:rPr lang="en-US" sz="2800" dirty="0" err="1">
+                <a:latin typeface="Courier New" charset="0"/>
+                <a:ea typeface="Courier New" charset="0"/>
+                <a:cs typeface="Courier New" charset="0"/>
+              </a:rPr>
+              <a:t>edu</a:t>
+            </a:r>
+            <a:r>
+              <a:rPr lang="en-US" sz="2800" dirty="0">
+                <a:latin typeface="Courier New" charset="0"/>
+                <a:ea typeface="Courier New" charset="0"/>
+                <a:cs typeface="Courier New" charset="0"/>
+              </a:rPr>
+              <a:t>/python/</a:t>
+            </a:r>
+            <a:r>
+              <a:rPr lang="en-US" dirty="0"/>
+              <a:t/>
+            </a:r>
+            <a:br>
+              <a:rPr lang="en-US" dirty="0"/>
+            </a:br>
+            <a:endParaRPr lang="en-US" dirty="0" smtClean="0"/>
+          </a:p>
+          <a:p>
+            <a:pPr marL="0" indent="0">
+              <a:buNone/>
+            </a:pPr>
+            <a:r>
+              <a:rPr lang="en-US" dirty="0" smtClean="0"/>
+              <a:t>Requirements for submission is on next page.</a:t>
+            </a:r>
+            <a:endParaRPr lang="en-US" dirty="0"/>
+          </a:p>
+        </p:txBody>
+      </p:sp>
+    </p:spTree>
+    <p:extLst>
+      <p:ext uri="{BB962C8B-B14F-4D97-AF65-F5344CB8AC3E}">
+        <p14:creationId xmlns:p14="http://schemas.microsoft.com/office/powerpoint/2010/main" val="279904487"/>
+      </p:ext>
+    </p:extLst>
+  </p:cSld>
+  <p:clrMapOvr>
+    <a:masterClrMapping/>
+  </p:clrMapOvr>
+</p:sld>
+</file>
+
+<file path=ppt/slides/slide29.xml><?xml version="1.0" encoding="utf-8"?>
+<p:sld xmlns:a="http://schemas.openxmlformats.org/drawingml/2006/main" xmlns:r="http://schemas.openxmlformats.org/officeDocument/2006/relationships" xmlns:p="http://schemas.openxmlformats.org/presentationml/2006/main">
+  <p:cSld>
+    <p:spTree>
+      <p:nvGrpSpPr>
+        <p:cNvPr id="1" name=""/>
+        <p:cNvGrpSpPr/>
+        <p:nvPr/>
+      </p:nvGrpSpPr>
+      <p:grpSpPr>
+        <a:xfrm>
+          <a:off x="0" y="0"/>
+          <a:ext cx="0" cy="0"/>
+          <a:chOff x="0" y="0"/>
+          <a:chExt cx="0" cy="0"/>
+        </a:xfrm>
+      </p:grpSpPr>
+      <p:sp>
+        <p:nvSpPr>
+          <p:cNvPr id="2" name="Title 1"/>
+          <p:cNvSpPr>
+            <a:spLocks noGrp="1"/>
+          </p:cNvSpPr>
+          <p:nvPr>
+            <p:ph type="title"/>
+          </p:nvPr>
+        </p:nvSpPr>
+        <p:spPr>
+          <a:xfrm>
+            <a:off x="838200" y="365125"/>
+            <a:ext cx="11353800" cy="1325563"/>
+          </a:xfrm>
+        </p:spPr>
+        <p:txBody>
+          <a:bodyPr>
+            <a:normAutofit/>
+          </a:bodyPr>
+          <a:lstStyle/>
+          <a:p>
+            <a:r>
+              <a:rPr lang="en-US" sz="3800" b="1" dirty="0" smtClean="0">
+                <a:latin typeface="Arial Hebrew" charset="-79"/>
+                <a:ea typeface="Arial Hebrew" charset="-79"/>
+                <a:cs typeface="Arial Hebrew" charset="-79"/>
+              </a:rPr>
+              <a:t>Submission Requirements:</a:t>
+            </a:r>
+            <a:endParaRPr lang="en-US" sz="3800" b="1" dirty="0">
+              <a:latin typeface="Arial Hebrew" charset="-79"/>
+              <a:ea typeface="Arial Hebrew" charset="-79"/>
+              <a:cs typeface="Arial Hebrew" charset="-79"/>
+            </a:endParaRPr>
+          </a:p>
+        </p:txBody>
+      </p:sp>
+      <p:sp>
+        <p:nvSpPr>
+          <p:cNvPr id="3" name="Content Placeholder 2"/>
+          <p:cNvSpPr>
+            <a:spLocks noGrp="1"/>
+          </p:cNvSpPr>
+          <p:nvPr>
+            <p:ph idx="1"/>
+          </p:nvPr>
+        </p:nvSpPr>
+        <p:spPr>
+          <a:xfrm>
+            <a:off x="838200" y="1825624"/>
+            <a:ext cx="10295965" cy="5032375"/>
+          </a:xfrm>
+        </p:spPr>
+        <p:txBody>
+          <a:bodyPr>
+            <a:normAutofit/>
+          </a:bodyPr>
+          <a:lstStyle/>
+          <a:p>
+            <a:r>
+              <a:rPr lang="en-US" dirty="0"/>
+              <a:t>Use the Twitter API to a good sample of tweets about “trump” and “</a:t>
+            </a:r>
+            <a:r>
+              <a:rPr lang="en-US" dirty="0" err="1"/>
+              <a:t>clinton</a:t>
+            </a:r>
+            <a:r>
+              <a:rPr lang="en-US" dirty="0"/>
+              <a:t>”. (Suggestion: at least 100 tweets each).</a:t>
+            </a:r>
+          </a:p>
+          <a:p>
+            <a:r>
+              <a:rPr lang="en-US" dirty="0"/>
+              <a:t>Count the most frequently associated words for both categories.</a:t>
+            </a:r>
+          </a:p>
+          <a:p>
+            <a:r>
+              <a:rPr lang="en-US" dirty="0"/>
+              <a:t>Print the top 10 most associated words which are not “stop words”.</a:t>
+            </a:r>
+          </a:p>
+          <a:p>
+            <a:r>
+              <a:rPr lang="en-US" dirty="0"/>
+              <a:t>Assign value </a:t>
+            </a:r>
+            <a:r>
+              <a:rPr lang="en-US" dirty="0" smtClean="0"/>
+              <a:t>1 </a:t>
+            </a:r>
+            <a:r>
+              <a:rPr lang="en-US" dirty="0"/>
+              <a:t>for "positive" sentiment, -1 for "negative" sentiment for each of the top 10 words.</a:t>
+            </a:r>
+          </a:p>
+          <a:p>
+            <a:r>
+              <a:rPr lang="en-US" dirty="0"/>
+              <a:t>What is the average </a:t>
+            </a:r>
+            <a:r>
+              <a:rPr lang="en-US"/>
+              <a:t>sentiment </a:t>
+            </a:r>
+            <a:r>
+              <a:rPr lang="en-US" smtClean="0"/>
+              <a:t>value (as represented by the top 10 words) </a:t>
+            </a:r>
+            <a:r>
+              <a:rPr lang="en-US" dirty="0"/>
+              <a:t>for tweets associated with "trump" and "</a:t>
+            </a:r>
+            <a:r>
+              <a:rPr lang="en-US" dirty="0" err="1"/>
+              <a:t>clinton</a:t>
+            </a:r>
+            <a:r>
+              <a:rPr lang="en-US" dirty="0" smtClean="0"/>
+              <a:t>"?</a:t>
+            </a:r>
+          </a:p>
+          <a:p>
+            <a:r>
+              <a:rPr lang="en-US" dirty="0" smtClean="0"/>
+              <a:t>Attach your code to your submission</a:t>
+            </a:r>
+            <a:endParaRPr lang="en-US" dirty="0"/>
+          </a:p>
+          <a:p>
+            <a:pPr marL="0" indent="0">
+              <a:buNone/>
+            </a:pPr>
+            <a:endParaRPr lang="en-US" dirty="0"/>
+          </a:p>
+        </p:txBody>
+      </p:sp>
+    </p:spTree>
+    <p:extLst>
+      <p:ext uri="{BB962C8B-B14F-4D97-AF65-F5344CB8AC3E}">
+        <p14:creationId xmlns:p14="http://schemas.microsoft.com/office/powerpoint/2010/main" val="1066771082"/>
+      </p:ext>
+    </p:extLst>
+  </p:cSld>
+  <p:clrMapOvr>
+    <a:masterClrMapping/>
+  </p:clrMapOvr>
+</p:sld>
+</file>
+
+<file path=ppt/slides/slide3.xml><?xml version="1.0" encoding="utf-8"?>
+<p:sld xmlns:a="http://schemas.openxmlformats.org/drawingml/2006/main" xmlns:r="http://schemas.openxmlformats.org/officeDocument/2006/relationships" xmlns:p="http://schemas.openxmlformats.org/presentationml/2006/main">
+  <p:cSld>
+    <p:spTree>
+      <p:nvGrpSpPr>
+        <p:cNvPr id="1" name=""/>
+        <p:cNvGrpSpPr/>
+        <p:nvPr/>
+      </p:nvGrpSpPr>
+      <p:grpSpPr>
+        <a:xfrm>
+          <a:off x="0" y="0"/>
+          <a:ext cx="0" cy="0"/>
+          <a:chOff x="0" y="0"/>
+          <a:chExt cx="0" cy="0"/>
+        </a:xfrm>
+      </p:grpSpPr>
+      <p:sp>
+        <p:nvSpPr>
+          <p:cNvPr id="2" name="Title 1"/>
+          <p:cNvSpPr>
+            <a:spLocks noGrp="1"/>
+          </p:cNvSpPr>
+          <p:nvPr>
+            <p:ph type="ctrTitle"/>
+          </p:nvPr>
+        </p:nvSpPr>
+        <p:spPr/>
+        <p:txBody>
+          <a:bodyPr/>
+          <a:lstStyle/>
+          <a:p>
+            <a:r>
+              <a:rPr lang="en-US" dirty="0" smtClean="0"/>
+              <a:t>Python Review</a:t>
+            </a:r>
+            <a:endParaRPr lang="en-US" dirty="0"/>
+          </a:p>
+        </p:txBody>
+      </p:sp>
+    </p:spTree>
+    <p:extLst>
+      <p:ext uri="{BB962C8B-B14F-4D97-AF65-F5344CB8AC3E}">
+        <p14:creationId xmlns:p14="http://schemas.microsoft.com/office/powerpoint/2010/main" val="264245825"/>
+      </p:ext>
+    </p:extLst>
+  </p:cSld>
+  <p:clrMapOvr>
+    <a:masterClrMapping/>
+  </p:clrMapOvr>
+  <p:timing>
+    <p:tnLst>
+      <p:par>
+        <p:cTn id="1" dur="indefinite" restart="never" nodeType="tmRoot"/>
+      </p:par>
+    </p:tnLst>
+  </p:timing>
+</p:sld>
+</file>
+
+<file path=ppt/slides/slide30.xml><?xml version="1.0" encoding="utf-8"?>
+<p:sld xmlns:a="http://schemas.openxmlformats.org/drawingml/2006/main" xmlns:r="http://schemas.openxmlformats.org/officeDocument/2006/relationships" xmlns:p="http://schemas.openxmlformats.org/presentationml/2006/main">
+  <p:cSld>
+    <p:spTree>
+      <p:nvGrpSpPr>
+        <p:cNvPr id="1" name=""/>
+        <p:cNvGrpSpPr/>
+        <p:nvPr/>
+      </p:nvGrpSpPr>
+      <p:grpSpPr>
+        <a:xfrm>
+          <a:off x="0" y="0"/>
+          <a:ext cx="0" cy="0"/>
+          <a:chOff x="0" y="0"/>
+          <a:chExt cx="0" cy="0"/>
+        </a:xfrm>
+      </p:grpSpPr>
       <p:sp>
         <p:nvSpPr>
           <p:cNvPr id="2" name="Title 1"/>
@@ -13568,7 +14118,7 @@
 </p:sld>
 </file>
 
-<file path=ppt/slides/slide28.xml><?xml version="1.0" encoding="utf-8"?>
+<file path=ppt/slides/slide31.xml><?xml version="1.0" encoding="utf-8"?>
 <p:sld xmlns:a="http://schemas.openxmlformats.org/drawingml/2006/main" xmlns:r="http://schemas.openxmlformats.org/officeDocument/2006/relationships" xmlns:p="http://schemas.openxmlformats.org/presentationml/2006/main">
   <p:cSld>
     <p:spTree>
@@ -13625,66 +14175,6 @@
     <p:extLst>
       <p:ext uri="{BB962C8B-B14F-4D97-AF65-F5344CB8AC3E}">
         <p14:creationId xmlns:p14="http://schemas.microsoft.com/office/powerpoint/2010/main" val="218468331"/>
-      </p:ext>
-    </p:extLst>
-  </p:cSld>
-  <p:clrMapOvr>
-    <a:masterClrMapping/>
-  </p:clrMapOvr>
-  <p:timing>
-    <p:tnLst>
-      <p:par>
-        <p:cTn id="1" dur="indefinite" restart="never" nodeType="tmRoot"/>
-      </p:par>
-    </p:tnLst>
-  </p:timing>
-</p:sld>
-</file>
-
-<file path=ppt/slides/slide3.xml><?xml version="1.0" encoding="utf-8"?>
-<p:sld xmlns:a="http://schemas.openxmlformats.org/drawingml/2006/main" xmlns:r="http://schemas.openxmlformats.org/officeDocument/2006/relationships" xmlns:p="http://schemas.openxmlformats.org/presentationml/2006/main">
-  <p:cSld>
-    <p:spTree>
-      <p:nvGrpSpPr>
-        <p:cNvPr id="1" name=""/>
-        <p:cNvGrpSpPr/>
-        <p:nvPr/>
-      </p:nvGrpSpPr>
-      <p:grpSpPr>
-        <a:xfrm>
-          <a:off x="0" y="0"/>
-          <a:ext cx="0" cy="0"/>
-          <a:chOff x="0" y="0"/>
-          <a:chExt cx="0" cy="0"/>
-        </a:xfrm>
-      </p:grpSpPr>
-      <p:sp>
-        <p:nvSpPr>
-          <p:cNvPr id="2" name="Title 1"/>
-          <p:cNvSpPr>
-            <a:spLocks noGrp="1"/>
-          </p:cNvSpPr>
-          <p:nvPr>
-            <p:ph type="ctrTitle"/>
-          </p:nvPr>
-        </p:nvSpPr>
-        <p:spPr/>
-        <p:txBody>
-          <a:bodyPr/>
-          <a:lstStyle/>
-          <a:p>
-            <a:r>
-              <a:rPr lang="en-US" dirty="0" smtClean="0"/>
-              <a:t>Python Review</a:t>
-            </a:r>
-            <a:endParaRPr lang="en-US" dirty="0"/>
-          </a:p>
-        </p:txBody>
-      </p:sp>
-    </p:spTree>
-    <p:extLst>
-      <p:ext uri="{BB962C8B-B14F-4D97-AF65-F5344CB8AC3E}">
-        <p14:creationId xmlns:p14="http://schemas.microsoft.com/office/powerpoint/2010/main" val="264245825"/>
       </p:ext>
     </p:extLst>
   </p:cSld>

</xml_diff>